<commit_message>
metodología de la aplicación
</commit_message>
<xml_diff>
--- a/informe/Proyecto_Final_Santamaria_Siesquen_Final.pptx
+++ b/informe/Proyecto_Final_Santamaria_Siesquen_Final.pptx
@@ -19,11 +19,12 @@
     <p:sldId id="268" r:id="rId13"/>
     <p:sldId id="266" r:id="rId14"/>
     <p:sldId id="293" r:id="rId15"/>
-    <p:sldId id="294" r:id="rId16"/>
-    <p:sldId id="295" r:id="rId17"/>
-    <p:sldId id="264" r:id="rId18"/>
-    <p:sldId id="296" r:id="rId19"/>
-    <p:sldId id="297" r:id="rId20"/>
+    <p:sldId id="298" r:id="rId16"/>
+    <p:sldId id="294" r:id="rId17"/>
+    <p:sldId id="295" r:id="rId18"/>
+    <p:sldId id="264" r:id="rId19"/>
+    <p:sldId id="296" r:id="rId20"/>
+    <p:sldId id="297" r:id="rId21"/>
   </p:sldIdLst>
   <p:sldSz cx="12192000" cy="6858000"/>
   <p:notesSz cx="6858000" cy="9144000"/>
@@ -8754,8 +8755,8 @@
         </p:nvSpPr>
         <p:spPr>
           <a:xfrm>
-            <a:off x="93305" y="550506"/>
-            <a:ext cx="1985287" cy="400110"/>
+            <a:off x="60647" y="550506"/>
+            <a:ext cx="4723729" cy="400110"/>
           </a:xfrm>
           <a:prstGeom prst="rect">
             <a:avLst/>
@@ -8773,7 +8774,7 @@
                 <a:latin typeface="Times New Roman" panose="02020603050405020304" pitchFamily="18" charset="0"/>
                 <a:cs typeface="Times New Roman" panose="02020603050405020304" pitchFamily="18" charset="0"/>
               </a:rPr>
-              <a:t>SISTEMA WEB</a:t>
+              <a:t>METODOLOGÍA DE LA APLICACIÓN</a:t>
             </a:r>
           </a:p>
         </p:txBody>
@@ -8792,6 +8793,1229 @@
         </p:nvSpPr>
         <p:spPr>
           <a:xfrm>
+            <a:off x="4354362" y="6342584"/>
+            <a:ext cx="2148345" cy="307777"/>
+          </a:xfrm>
+          <a:prstGeom prst="rect">
+            <a:avLst/>
+          </a:prstGeom>
+          <a:noFill/>
+        </p:spPr>
+        <p:txBody>
+          <a:bodyPr wrap="none" rtlCol="0">
+            <a:spAutoFit/>
+          </a:bodyPr>
+          <a:lstStyle/>
+          <a:p>
+            <a:r>
+              <a:rPr lang="es-PE" sz="1400" b="0" i="0" u="none" strike="noStrike" baseline="0" dirty="0">
+                <a:solidFill>
+                  <a:srgbClr val="000000"/>
+                </a:solidFill>
+                <a:latin typeface="Times New Roman" panose="02020603050405020304" pitchFamily="18" charset="0"/>
+                <a:cs typeface="Times New Roman" panose="02020603050405020304" pitchFamily="18" charset="0"/>
+              </a:rPr>
+              <a:t>Fuente: Elaboración Propia</a:t>
+            </a:r>
+            <a:endParaRPr lang="es-PE" sz="1400" dirty="0">
+              <a:latin typeface="Times New Roman" panose="02020603050405020304" pitchFamily="18" charset="0"/>
+              <a:cs typeface="Times New Roman" panose="02020603050405020304" pitchFamily="18" charset="0"/>
+            </a:endParaRPr>
+          </a:p>
+        </p:txBody>
+      </p:sp>
+      <p:cxnSp>
+        <p:nvCxnSpPr>
+          <p:cNvPr id="21" name="Conector recto de flecha 20">
+            <a:extLst>
+              <a:ext uri="{FF2B5EF4-FFF2-40B4-BE49-F238E27FC236}">
+                <a16:creationId xmlns:a16="http://schemas.microsoft.com/office/drawing/2014/main" id="{78ADA8B2-6CAB-F54E-E0EF-D243351BCDF4}"/>
+              </a:ext>
+            </a:extLst>
+          </p:cNvPr>
+          <p:cNvCxnSpPr>
+            <a:cxnSpLocks/>
+          </p:cNvCxnSpPr>
+          <p:nvPr/>
+        </p:nvCxnSpPr>
+        <p:spPr>
+          <a:xfrm>
+            <a:off x="2134568" y="3458951"/>
+            <a:ext cx="621370" cy="0"/>
+          </a:xfrm>
+          <a:prstGeom prst="straightConnector1">
+            <a:avLst/>
+          </a:prstGeom>
+          <a:ln>
+            <a:tailEnd type="triangle"/>
+          </a:ln>
+        </p:spPr>
+        <p:style>
+          <a:lnRef idx="1">
+            <a:schemeClr val="accent1"/>
+          </a:lnRef>
+          <a:fillRef idx="0">
+            <a:schemeClr val="accent1"/>
+          </a:fillRef>
+          <a:effectRef idx="0">
+            <a:schemeClr val="accent1"/>
+          </a:effectRef>
+          <a:fontRef idx="minor">
+            <a:schemeClr val="tx1"/>
+          </a:fontRef>
+        </p:style>
+      </p:cxnSp>
+      <p:grpSp>
+        <p:nvGrpSpPr>
+          <p:cNvPr id="34" name="Grupo 33">
+            <a:extLst>
+              <a:ext uri="{FF2B5EF4-FFF2-40B4-BE49-F238E27FC236}">
+                <a16:creationId xmlns:a16="http://schemas.microsoft.com/office/drawing/2014/main" id="{B6E8E295-09F6-9067-30B2-43D25FA88E6B}"/>
+              </a:ext>
+            </a:extLst>
+          </p:cNvPr>
+          <p:cNvGrpSpPr/>
+          <p:nvPr/>
+        </p:nvGrpSpPr>
+        <p:grpSpPr>
+          <a:xfrm>
+            <a:off x="1011961" y="2937650"/>
+            <a:ext cx="1265090" cy="959845"/>
+            <a:chOff x="668298" y="2114716"/>
+            <a:chExt cx="1265090" cy="959845"/>
+          </a:xfrm>
+        </p:grpSpPr>
+        <p:pic>
+          <p:nvPicPr>
+            <p:cNvPr id="26" name="Imagen 25" descr="Imagen que contiene tarjeta de presentación&#10;&#10;Descripción generada automáticamente">
+              <a:extLst>
+                <a:ext uri="{FF2B5EF4-FFF2-40B4-BE49-F238E27FC236}">
+                  <a16:creationId xmlns:a16="http://schemas.microsoft.com/office/drawing/2014/main" id="{F0870BC5-D8B4-3670-0512-7FF12B0CB810}"/>
+                </a:ext>
+              </a:extLst>
+            </p:cNvPr>
+            <p:cNvPicPr>
+              <a:picLocks noChangeAspect="1"/>
+            </p:cNvPicPr>
+            <p:nvPr/>
+          </p:nvPicPr>
+          <p:blipFill>
+            <a:blip r:embed="rId2"/>
+            <a:stretch>
+              <a:fillRect/>
+            </a:stretch>
+          </p:blipFill>
+          <p:spPr>
+            <a:xfrm>
+              <a:off x="968829" y="2283538"/>
+              <a:ext cx="664028" cy="664028"/>
+            </a:xfrm>
+            <a:prstGeom prst="rect">
+              <a:avLst/>
+            </a:prstGeom>
+          </p:spPr>
+        </p:pic>
+        <p:sp>
+          <p:nvSpPr>
+            <p:cNvPr id="27" name="CuadroTexto 26">
+              <a:extLst>
+                <a:ext uri="{FF2B5EF4-FFF2-40B4-BE49-F238E27FC236}">
+                  <a16:creationId xmlns:a16="http://schemas.microsoft.com/office/drawing/2014/main" id="{006F7821-3B17-23BE-D065-E4BF5554761D}"/>
+                </a:ext>
+              </a:extLst>
+            </p:cNvPr>
+            <p:cNvSpPr txBox="1"/>
+            <p:nvPr/>
+          </p:nvSpPr>
+          <p:spPr>
+            <a:xfrm>
+              <a:off x="865371" y="2114716"/>
+              <a:ext cx="870944" cy="276999"/>
+            </a:xfrm>
+            <a:prstGeom prst="rect">
+              <a:avLst/>
+            </a:prstGeom>
+            <a:noFill/>
+          </p:spPr>
+          <p:txBody>
+            <a:bodyPr wrap="none" rtlCol="0">
+              <a:spAutoFit/>
+            </a:bodyPr>
+            <a:lstStyle/>
+            <a:p>
+              <a:r>
+                <a:rPr lang="es-PE" sz="1200" b="1" dirty="0"/>
+                <a:t>Windows</a:t>
+              </a:r>
+              <a:endParaRPr lang="es-ES" b="1" dirty="0"/>
+            </a:p>
+          </p:txBody>
+        </p:sp>
+        <p:sp>
+          <p:nvSpPr>
+            <p:cNvPr id="28" name="CuadroTexto 27">
+              <a:extLst>
+                <a:ext uri="{FF2B5EF4-FFF2-40B4-BE49-F238E27FC236}">
+                  <a16:creationId xmlns:a16="http://schemas.microsoft.com/office/drawing/2014/main" id="{E8B8FFE2-6C2B-264D-1502-CCCE3B9B130C}"/>
+                </a:ext>
+              </a:extLst>
+            </p:cNvPr>
+            <p:cNvSpPr txBox="1"/>
+            <p:nvPr/>
+          </p:nvSpPr>
+          <p:spPr>
+            <a:xfrm>
+              <a:off x="668298" y="2828340"/>
+              <a:ext cx="1265090" cy="246221"/>
+            </a:xfrm>
+            <a:prstGeom prst="rect">
+              <a:avLst/>
+            </a:prstGeom>
+            <a:noFill/>
+          </p:spPr>
+          <p:txBody>
+            <a:bodyPr wrap="none" rtlCol="0">
+              <a:spAutoFit/>
+            </a:bodyPr>
+            <a:lstStyle/>
+            <a:p>
+              <a:r>
+                <a:rPr lang="es-PE" sz="1000" dirty="0"/>
+                <a:t>Sistema Operativo</a:t>
+              </a:r>
+              <a:endParaRPr lang="es-ES" sz="1000" dirty="0"/>
+            </a:p>
+          </p:txBody>
+        </p:sp>
+      </p:grpSp>
+      <p:grpSp>
+        <p:nvGrpSpPr>
+          <p:cNvPr id="33" name="Grupo 32">
+            <a:extLst>
+              <a:ext uri="{FF2B5EF4-FFF2-40B4-BE49-F238E27FC236}">
+                <a16:creationId xmlns:a16="http://schemas.microsoft.com/office/drawing/2014/main" id="{6F9F3B4E-5626-C029-4558-08F765268263}"/>
+              </a:ext>
+            </a:extLst>
+          </p:cNvPr>
+          <p:cNvGrpSpPr/>
+          <p:nvPr/>
+        </p:nvGrpSpPr>
+        <p:grpSpPr>
+          <a:xfrm>
+            <a:off x="2755938" y="2891256"/>
+            <a:ext cx="934871" cy="1094460"/>
+            <a:chOff x="2153754" y="1976216"/>
+            <a:chExt cx="934871" cy="1094460"/>
+          </a:xfrm>
+        </p:grpSpPr>
+        <p:pic>
+          <p:nvPicPr>
+            <p:cNvPr id="30" name="Imagen 29" descr="Icono&#10;&#10;Descripción generada automáticamente">
+              <a:extLst>
+                <a:ext uri="{FF2B5EF4-FFF2-40B4-BE49-F238E27FC236}">
+                  <a16:creationId xmlns:a16="http://schemas.microsoft.com/office/drawing/2014/main" id="{E9F3E86C-5133-291C-D38D-2CFE812E3E13}"/>
+                </a:ext>
+              </a:extLst>
+            </p:cNvPr>
+            <p:cNvPicPr>
+              <a:picLocks noChangeAspect="1"/>
+            </p:cNvPicPr>
+            <p:nvPr/>
+          </p:nvPicPr>
+          <p:blipFill>
+            <a:blip r:embed="rId3"/>
+            <a:stretch>
+              <a:fillRect/>
+            </a:stretch>
+          </p:blipFill>
+          <p:spPr>
+            <a:xfrm>
+              <a:off x="2310505" y="2259305"/>
+              <a:ext cx="621370" cy="621370"/>
+            </a:xfrm>
+            <a:prstGeom prst="rect">
+              <a:avLst/>
+            </a:prstGeom>
+          </p:spPr>
+        </p:pic>
+        <p:sp>
+          <p:nvSpPr>
+            <p:cNvPr id="31" name="CuadroTexto 30">
+              <a:extLst>
+                <a:ext uri="{FF2B5EF4-FFF2-40B4-BE49-F238E27FC236}">
+                  <a16:creationId xmlns:a16="http://schemas.microsoft.com/office/drawing/2014/main" id="{9C70956C-9865-3A92-FEA0-756500F8AB65}"/>
+                </a:ext>
+              </a:extLst>
+            </p:cNvPr>
+            <p:cNvSpPr txBox="1"/>
+            <p:nvPr/>
+          </p:nvSpPr>
+          <p:spPr>
+            <a:xfrm>
+              <a:off x="2153754" y="1976216"/>
+              <a:ext cx="934871" cy="276999"/>
+            </a:xfrm>
+            <a:prstGeom prst="rect">
+              <a:avLst/>
+            </a:prstGeom>
+            <a:noFill/>
+          </p:spPr>
+          <p:txBody>
+            <a:bodyPr wrap="none" rtlCol="0">
+              <a:spAutoFit/>
+            </a:bodyPr>
+            <a:lstStyle/>
+            <a:p>
+              <a:r>
+                <a:rPr lang="es-PE" sz="1200" b="1" dirty="0"/>
+                <a:t>Anaconda</a:t>
+              </a:r>
+              <a:endParaRPr lang="es-ES" b="1" dirty="0"/>
+            </a:p>
+          </p:txBody>
+        </p:sp>
+        <p:sp>
+          <p:nvSpPr>
+            <p:cNvPr id="32" name="CuadroTexto 31">
+              <a:extLst>
+                <a:ext uri="{FF2B5EF4-FFF2-40B4-BE49-F238E27FC236}">
+                  <a16:creationId xmlns:a16="http://schemas.microsoft.com/office/drawing/2014/main" id="{30157C9F-4A40-6E4D-FDE2-9C482F20B535}"/>
+                </a:ext>
+              </a:extLst>
+            </p:cNvPr>
+            <p:cNvSpPr txBox="1"/>
+            <p:nvPr/>
+          </p:nvSpPr>
+          <p:spPr>
+            <a:xfrm>
+              <a:off x="2218674" y="2824455"/>
+              <a:ext cx="805029" cy="246221"/>
+            </a:xfrm>
+            <a:prstGeom prst="rect">
+              <a:avLst/>
+            </a:prstGeom>
+            <a:noFill/>
+          </p:spPr>
+          <p:txBody>
+            <a:bodyPr wrap="none" rtlCol="0">
+              <a:spAutoFit/>
+            </a:bodyPr>
+            <a:lstStyle/>
+            <a:p>
+              <a:r>
+                <a:rPr lang="es-PE" sz="1000" dirty="0"/>
+                <a:t>Desarrollo</a:t>
+              </a:r>
+              <a:endParaRPr lang="es-ES" sz="1000" dirty="0"/>
+            </a:p>
+          </p:txBody>
+        </p:sp>
+      </p:grpSp>
+      <p:grpSp>
+        <p:nvGrpSpPr>
+          <p:cNvPr id="46" name="Grupo 45">
+            <a:extLst>
+              <a:ext uri="{FF2B5EF4-FFF2-40B4-BE49-F238E27FC236}">
+                <a16:creationId xmlns:a16="http://schemas.microsoft.com/office/drawing/2014/main" id="{08428AD7-74AC-0059-092F-AE3C7489F20F}"/>
+              </a:ext>
+            </a:extLst>
+          </p:cNvPr>
+          <p:cNvGrpSpPr/>
+          <p:nvPr/>
+        </p:nvGrpSpPr>
+        <p:grpSpPr>
+          <a:xfrm>
+            <a:off x="8642008" y="2209264"/>
+            <a:ext cx="1373837" cy="1179957"/>
+            <a:chOff x="6411332" y="1440756"/>
+            <a:chExt cx="1297150" cy="1102269"/>
+          </a:xfrm>
+        </p:grpSpPr>
+        <p:pic>
+          <p:nvPicPr>
+            <p:cNvPr id="36" name="Imagen 35" descr="Icono&#10;&#10;Descripción generada automáticamente">
+              <a:extLst>
+                <a:ext uri="{FF2B5EF4-FFF2-40B4-BE49-F238E27FC236}">
+                  <a16:creationId xmlns:a16="http://schemas.microsoft.com/office/drawing/2014/main" id="{16E168F7-1D54-5861-7142-6D12C752269A}"/>
+                </a:ext>
+              </a:extLst>
+            </p:cNvPr>
+            <p:cNvPicPr>
+              <a:picLocks noChangeAspect="1"/>
+            </p:cNvPicPr>
+            <p:nvPr/>
+          </p:nvPicPr>
+          <p:blipFill>
+            <a:blip r:embed="rId4"/>
+            <a:stretch>
+              <a:fillRect/>
+            </a:stretch>
+          </p:blipFill>
+          <p:spPr>
+            <a:xfrm>
+              <a:off x="6739605" y="1902421"/>
+              <a:ext cx="640604" cy="640604"/>
+            </a:xfrm>
+            <a:prstGeom prst="rect">
+              <a:avLst/>
+            </a:prstGeom>
+          </p:spPr>
+        </p:pic>
+        <p:sp>
+          <p:nvSpPr>
+            <p:cNvPr id="37" name="CuadroTexto 36">
+              <a:extLst>
+                <a:ext uri="{FF2B5EF4-FFF2-40B4-BE49-F238E27FC236}">
+                  <a16:creationId xmlns:a16="http://schemas.microsoft.com/office/drawing/2014/main" id="{4C0B0F9E-DB48-1CDB-68F5-0CA3EDCF1F50}"/>
+                </a:ext>
+              </a:extLst>
+            </p:cNvPr>
+            <p:cNvSpPr txBox="1"/>
+            <p:nvPr/>
+          </p:nvSpPr>
+          <p:spPr>
+            <a:xfrm>
+              <a:off x="6411332" y="1440756"/>
+              <a:ext cx="1297150" cy="461665"/>
+            </a:xfrm>
+            <a:prstGeom prst="rect">
+              <a:avLst/>
+            </a:prstGeom>
+            <a:noFill/>
+          </p:spPr>
+          <p:txBody>
+            <a:bodyPr wrap="none" rtlCol="0">
+              <a:spAutoFit/>
+            </a:bodyPr>
+            <a:lstStyle/>
+            <a:p>
+              <a:pPr algn="ctr"/>
+              <a:r>
+                <a:rPr lang="es-PE" sz="1200" b="1" dirty="0"/>
+                <a:t>Firebase </a:t>
+              </a:r>
+            </a:p>
+            <a:p>
+              <a:pPr algn="ctr"/>
+              <a:r>
+                <a:rPr lang="es-PE" sz="1200" b="1" dirty="0"/>
+                <a:t>Authentication</a:t>
+              </a:r>
+              <a:endParaRPr lang="es-ES" b="1" dirty="0"/>
+            </a:p>
+          </p:txBody>
+        </p:sp>
+      </p:grpSp>
+      <p:grpSp>
+        <p:nvGrpSpPr>
+          <p:cNvPr id="49" name="Grupo 48">
+            <a:extLst>
+              <a:ext uri="{FF2B5EF4-FFF2-40B4-BE49-F238E27FC236}">
+                <a16:creationId xmlns:a16="http://schemas.microsoft.com/office/drawing/2014/main" id="{B1BADBD1-AFD5-2F61-41A2-89A1FA262627}"/>
+              </a:ext>
+            </a:extLst>
+          </p:cNvPr>
+          <p:cNvGrpSpPr/>
+          <p:nvPr/>
+        </p:nvGrpSpPr>
+        <p:grpSpPr>
+          <a:xfrm>
+            <a:off x="5413051" y="1784780"/>
+            <a:ext cx="1016432" cy="3783404"/>
+            <a:chOff x="4110034" y="1763922"/>
+            <a:chExt cx="1016432" cy="3783404"/>
+          </a:xfrm>
+        </p:grpSpPr>
+        <p:grpSp>
+          <p:nvGrpSpPr>
+            <p:cNvPr id="24" name="Grupo 23">
+              <a:extLst>
+                <a:ext uri="{FF2B5EF4-FFF2-40B4-BE49-F238E27FC236}">
+                  <a16:creationId xmlns:a16="http://schemas.microsoft.com/office/drawing/2014/main" id="{AF31D1D5-5BB6-A15A-7BC4-67FA702F28C5}"/>
+                </a:ext>
+              </a:extLst>
+            </p:cNvPr>
+            <p:cNvGrpSpPr/>
+            <p:nvPr/>
+          </p:nvGrpSpPr>
+          <p:grpSpPr>
+            <a:xfrm>
+              <a:off x="4206838" y="1763922"/>
+              <a:ext cx="712054" cy="779103"/>
+              <a:chOff x="959785" y="2821347"/>
+              <a:chExt cx="712054" cy="779103"/>
+            </a:xfrm>
+          </p:grpSpPr>
+          <p:pic>
+            <p:nvPicPr>
+              <p:cNvPr id="11" name="Gráfico 10">
+                <a:extLst>
+                  <a:ext uri="{FF2B5EF4-FFF2-40B4-BE49-F238E27FC236}">
+                    <a16:creationId xmlns:a16="http://schemas.microsoft.com/office/drawing/2014/main" id="{D4A56704-3D83-96CF-FA93-6421E4528376}"/>
+                  </a:ext>
+                </a:extLst>
+              </p:cNvPr>
+              <p:cNvPicPr>
+                <a:picLocks noChangeAspect="1"/>
+              </p:cNvPicPr>
+              <p:nvPr/>
+            </p:nvPicPr>
+            <p:blipFill>
+              <a:blip r:embed="rId5">
+                <a:extLst>
+                  <a:ext uri="{96DAC541-7B7A-43D3-8B79-37D633B846F1}">
+                    <asvg:svgBlip xmlns:asvg="http://schemas.microsoft.com/office/drawing/2016/SVG/main" r:embed="rId6"/>
+                  </a:ext>
+                </a:extLst>
+              </a:blip>
+              <a:stretch>
+                <a:fillRect/>
+              </a:stretch>
+            </p:blipFill>
+            <p:spPr>
+              <a:xfrm>
+                <a:off x="1058638" y="3098346"/>
+                <a:ext cx="502104" cy="502104"/>
+              </a:xfrm>
+              <a:prstGeom prst="rect">
+                <a:avLst/>
+              </a:prstGeom>
+            </p:spPr>
+          </p:pic>
+          <p:sp>
+            <p:nvSpPr>
+              <p:cNvPr id="12" name="CuadroTexto 11">
+                <a:extLst>
+                  <a:ext uri="{FF2B5EF4-FFF2-40B4-BE49-F238E27FC236}">
+                    <a16:creationId xmlns:a16="http://schemas.microsoft.com/office/drawing/2014/main" id="{E11AA0C1-D776-0A21-1CAA-16AE6AF21BC5}"/>
+                  </a:ext>
+                </a:extLst>
+              </p:cNvPr>
+              <p:cNvSpPr txBox="1"/>
+              <p:nvPr/>
+            </p:nvSpPr>
+            <p:spPr>
+              <a:xfrm>
+                <a:off x="959785" y="2821347"/>
+                <a:ext cx="712054" cy="276999"/>
+              </a:xfrm>
+              <a:prstGeom prst="rect">
+                <a:avLst/>
+              </a:prstGeom>
+              <a:noFill/>
+            </p:spPr>
+            <p:txBody>
+              <a:bodyPr wrap="none" rtlCol="0">
+                <a:spAutoFit/>
+              </a:bodyPr>
+              <a:lstStyle/>
+              <a:p>
+                <a:r>
+                  <a:rPr lang="es-PE" sz="1200" b="1" dirty="0"/>
+                  <a:t>Python</a:t>
+                </a:r>
+                <a:endParaRPr lang="es-ES" b="1" dirty="0"/>
+              </a:p>
+            </p:txBody>
+          </p:sp>
+        </p:grpSp>
+        <p:grpSp>
+          <p:nvGrpSpPr>
+            <p:cNvPr id="23" name="Grupo 22">
+              <a:extLst>
+                <a:ext uri="{FF2B5EF4-FFF2-40B4-BE49-F238E27FC236}">
+                  <a16:creationId xmlns:a16="http://schemas.microsoft.com/office/drawing/2014/main" id="{6FD085E1-8909-A37E-46ED-A5DC315ED5A1}"/>
+                </a:ext>
+              </a:extLst>
+            </p:cNvPr>
+            <p:cNvGrpSpPr/>
+            <p:nvPr/>
+          </p:nvGrpSpPr>
+          <p:grpSpPr>
+            <a:xfrm>
+              <a:off x="4231435" y="2639886"/>
+              <a:ext cx="729815" cy="789114"/>
+              <a:chOff x="2157620" y="2790244"/>
+              <a:chExt cx="729815" cy="789114"/>
+            </a:xfrm>
+          </p:grpSpPr>
+          <p:pic>
+            <p:nvPicPr>
+              <p:cNvPr id="17" name="Imagen 16" descr="Dibujo con letras blancas&#10;&#10;Descripción generada automáticamente con confianza media">
+                <a:extLst>
+                  <a:ext uri="{FF2B5EF4-FFF2-40B4-BE49-F238E27FC236}">
+                    <a16:creationId xmlns:a16="http://schemas.microsoft.com/office/drawing/2014/main" id="{B4374C0F-01B2-434C-4ECE-23D6BBFCC2E5}"/>
+                  </a:ext>
+                </a:extLst>
+              </p:cNvPr>
+              <p:cNvPicPr>
+                <a:picLocks noChangeAspect="1"/>
+              </p:cNvPicPr>
+              <p:nvPr/>
+            </p:nvPicPr>
+            <p:blipFill>
+              <a:blip r:embed="rId7"/>
+              <a:stretch>
+                <a:fillRect/>
+              </a:stretch>
+            </p:blipFill>
+            <p:spPr>
+              <a:xfrm>
+                <a:off x="2280547" y="3119437"/>
+                <a:ext cx="459921" cy="459921"/>
+              </a:xfrm>
+              <a:prstGeom prst="rect">
+                <a:avLst/>
+              </a:prstGeom>
+            </p:spPr>
+          </p:pic>
+          <p:sp>
+            <p:nvSpPr>
+              <p:cNvPr id="18" name="CuadroTexto 17">
+                <a:extLst>
+                  <a:ext uri="{FF2B5EF4-FFF2-40B4-BE49-F238E27FC236}">
+                    <a16:creationId xmlns:a16="http://schemas.microsoft.com/office/drawing/2014/main" id="{59B017B4-DE8D-9889-6185-249A2B2CCA2E}"/>
+                  </a:ext>
+                </a:extLst>
+              </p:cNvPr>
+              <p:cNvSpPr txBox="1"/>
+              <p:nvPr/>
+            </p:nvSpPr>
+            <p:spPr>
+              <a:xfrm>
+                <a:off x="2157620" y="2790244"/>
+                <a:ext cx="729815" cy="276999"/>
+              </a:xfrm>
+              <a:prstGeom prst="rect">
+                <a:avLst/>
+              </a:prstGeom>
+              <a:noFill/>
+            </p:spPr>
+            <p:txBody>
+              <a:bodyPr wrap="none" rtlCol="0">
+                <a:spAutoFit/>
+              </a:bodyPr>
+              <a:lstStyle/>
+              <a:p>
+                <a:r>
+                  <a:rPr lang="es-PE" sz="1200" b="1" dirty="0"/>
+                  <a:t>Django</a:t>
+                </a:r>
+                <a:endParaRPr lang="es-ES" b="1" dirty="0"/>
+              </a:p>
+            </p:txBody>
+          </p:sp>
+        </p:grpSp>
+        <p:grpSp>
+          <p:nvGrpSpPr>
+            <p:cNvPr id="41" name="Grupo 40">
+              <a:extLst>
+                <a:ext uri="{FF2B5EF4-FFF2-40B4-BE49-F238E27FC236}">
+                  <a16:creationId xmlns:a16="http://schemas.microsoft.com/office/drawing/2014/main" id="{52F3710F-C20B-3990-A335-ABD9142FCAE1}"/>
+                </a:ext>
+              </a:extLst>
+            </p:cNvPr>
+            <p:cNvGrpSpPr/>
+            <p:nvPr/>
+          </p:nvGrpSpPr>
+          <p:grpSpPr>
+            <a:xfrm>
+              <a:off x="4269909" y="3634429"/>
+              <a:ext cx="628826" cy="830380"/>
+              <a:chOff x="4282006" y="4296500"/>
+              <a:chExt cx="628826" cy="830380"/>
+            </a:xfrm>
+          </p:grpSpPr>
+          <p:pic>
+            <p:nvPicPr>
+              <p:cNvPr id="39" name="Imagen 38" descr="Logotipo&#10;&#10;Descripción generada automáticamente">
+                <a:extLst>
+                  <a:ext uri="{FF2B5EF4-FFF2-40B4-BE49-F238E27FC236}">
+                    <a16:creationId xmlns:a16="http://schemas.microsoft.com/office/drawing/2014/main" id="{B3A32712-EDE5-BB44-B680-17AB7430C7E7}"/>
+                  </a:ext>
+                </a:extLst>
+              </p:cNvPr>
+              <p:cNvPicPr>
+                <a:picLocks noChangeAspect="1"/>
+              </p:cNvPicPr>
+              <p:nvPr/>
+            </p:nvPicPr>
+            <p:blipFill>
+              <a:blip r:embed="rId8"/>
+              <a:stretch>
+                <a:fillRect/>
+              </a:stretch>
+            </p:blipFill>
+            <p:spPr>
+              <a:xfrm>
+                <a:off x="4354362" y="4611003"/>
+                <a:ext cx="515877" cy="515877"/>
+              </a:xfrm>
+              <a:prstGeom prst="rect">
+                <a:avLst/>
+              </a:prstGeom>
+            </p:spPr>
+          </p:pic>
+          <p:sp>
+            <p:nvSpPr>
+              <p:cNvPr id="40" name="CuadroTexto 39">
+                <a:extLst>
+                  <a:ext uri="{FF2B5EF4-FFF2-40B4-BE49-F238E27FC236}">
+                    <a16:creationId xmlns:a16="http://schemas.microsoft.com/office/drawing/2014/main" id="{2E32F743-6E59-7DCE-094D-9CB0090D6155}"/>
+                  </a:ext>
+                </a:extLst>
+              </p:cNvPr>
+              <p:cNvSpPr txBox="1"/>
+              <p:nvPr/>
+            </p:nvSpPr>
+            <p:spPr>
+              <a:xfrm>
+                <a:off x="4282006" y="4296500"/>
+                <a:ext cx="628826" cy="276999"/>
+              </a:xfrm>
+              <a:prstGeom prst="rect">
+                <a:avLst/>
+              </a:prstGeom>
+              <a:noFill/>
+            </p:spPr>
+            <p:txBody>
+              <a:bodyPr wrap="none" rtlCol="0">
+                <a:spAutoFit/>
+              </a:bodyPr>
+              <a:lstStyle/>
+              <a:p>
+                <a:r>
+                  <a:rPr lang="es-PE" sz="1200" b="1" dirty="0"/>
+                  <a:t>Keras</a:t>
+                </a:r>
+                <a:endParaRPr lang="es-ES" b="1" dirty="0"/>
+              </a:p>
+            </p:txBody>
+          </p:sp>
+        </p:grpSp>
+        <p:grpSp>
+          <p:nvGrpSpPr>
+            <p:cNvPr id="45" name="Grupo 44">
+              <a:extLst>
+                <a:ext uri="{FF2B5EF4-FFF2-40B4-BE49-F238E27FC236}">
+                  <a16:creationId xmlns:a16="http://schemas.microsoft.com/office/drawing/2014/main" id="{0F116A28-0513-24B6-27E7-80E3F4FF69CA}"/>
+                </a:ext>
+              </a:extLst>
+            </p:cNvPr>
+            <p:cNvGrpSpPr/>
+            <p:nvPr/>
+          </p:nvGrpSpPr>
+          <p:grpSpPr>
+            <a:xfrm>
+              <a:off x="4110034" y="4680927"/>
+              <a:ext cx="1016432" cy="866399"/>
+              <a:chOff x="4110034" y="4680927"/>
+              <a:chExt cx="1016432" cy="866399"/>
+            </a:xfrm>
+          </p:grpSpPr>
+          <p:pic>
+            <p:nvPicPr>
+              <p:cNvPr id="43" name="Imagen 42" descr="Logotipo&#10;&#10;Descripción generada automáticamente">
+                <a:extLst>
+                  <a:ext uri="{FF2B5EF4-FFF2-40B4-BE49-F238E27FC236}">
+                    <a16:creationId xmlns:a16="http://schemas.microsoft.com/office/drawing/2014/main" id="{8F2E4155-6ED2-4361-2D2B-68AF3029D0AE}"/>
+                  </a:ext>
+                </a:extLst>
+              </p:cNvPr>
+              <p:cNvPicPr>
+                <a:picLocks noChangeAspect="1"/>
+              </p:cNvPicPr>
+              <p:nvPr/>
+            </p:nvPicPr>
+            <p:blipFill>
+              <a:blip r:embed="rId9"/>
+              <a:stretch>
+                <a:fillRect/>
+              </a:stretch>
+            </p:blipFill>
+            <p:spPr>
+              <a:xfrm>
+                <a:off x="4337766" y="4986357"/>
+                <a:ext cx="560969" cy="560969"/>
+              </a:xfrm>
+              <a:prstGeom prst="rect">
+                <a:avLst/>
+              </a:prstGeom>
+            </p:spPr>
+          </p:pic>
+          <p:sp>
+            <p:nvSpPr>
+              <p:cNvPr id="44" name="CuadroTexto 43">
+                <a:extLst>
+                  <a:ext uri="{FF2B5EF4-FFF2-40B4-BE49-F238E27FC236}">
+                    <a16:creationId xmlns:a16="http://schemas.microsoft.com/office/drawing/2014/main" id="{15D5A6EF-0DCF-1B9F-D21E-E3C502421383}"/>
+                  </a:ext>
+                </a:extLst>
+              </p:cNvPr>
+              <p:cNvSpPr txBox="1"/>
+              <p:nvPr/>
+            </p:nvSpPr>
+            <p:spPr>
+              <a:xfrm>
+                <a:off x="4110034" y="4680927"/>
+                <a:ext cx="1016432" cy="276999"/>
+              </a:xfrm>
+              <a:prstGeom prst="rect">
+                <a:avLst/>
+              </a:prstGeom>
+              <a:noFill/>
+            </p:spPr>
+            <p:txBody>
+              <a:bodyPr wrap="none" rtlCol="0">
+                <a:spAutoFit/>
+              </a:bodyPr>
+              <a:lstStyle/>
+              <a:p>
+                <a:r>
+                  <a:rPr lang="es-PE" sz="1200" b="1" dirty="0"/>
+                  <a:t>Tensorflow</a:t>
+                </a:r>
+                <a:endParaRPr lang="es-ES" b="1" dirty="0"/>
+              </a:p>
+            </p:txBody>
+          </p:sp>
+        </p:grpSp>
+      </p:grpSp>
+      <p:cxnSp>
+        <p:nvCxnSpPr>
+          <p:cNvPr id="47" name="Conector recto de flecha 46">
+            <a:extLst>
+              <a:ext uri="{FF2B5EF4-FFF2-40B4-BE49-F238E27FC236}">
+                <a16:creationId xmlns:a16="http://schemas.microsoft.com/office/drawing/2014/main" id="{637C5FD2-77B9-24D1-CFCB-E0B2339CAC44}"/>
+              </a:ext>
+            </a:extLst>
+          </p:cNvPr>
+          <p:cNvCxnSpPr>
+            <a:cxnSpLocks/>
+          </p:cNvCxnSpPr>
+          <p:nvPr/>
+        </p:nvCxnSpPr>
+        <p:spPr>
+          <a:xfrm>
+            <a:off x="3870840" y="3458951"/>
+            <a:ext cx="621370" cy="0"/>
+          </a:xfrm>
+          <a:prstGeom prst="straightConnector1">
+            <a:avLst/>
+          </a:prstGeom>
+          <a:ln>
+            <a:tailEnd type="triangle"/>
+          </a:ln>
+        </p:spPr>
+        <p:style>
+          <a:lnRef idx="1">
+            <a:schemeClr val="accent1"/>
+          </a:lnRef>
+          <a:fillRef idx="0">
+            <a:schemeClr val="accent1"/>
+          </a:fillRef>
+          <a:effectRef idx="0">
+            <a:schemeClr val="accent1"/>
+          </a:effectRef>
+          <a:fontRef idx="minor">
+            <a:schemeClr val="tx1"/>
+          </a:fontRef>
+        </p:style>
+      </p:cxnSp>
+      <p:sp>
+        <p:nvSpPr>
+          <p:cNvPr id="48" name="Rectángulo 47">
+            <a:extLst>
+              <a:ext uri="{FF2B5EF4-FFF2-40B4-BE49-F238E27FC236}">
+                <a16:creationId xmlns:a16="http://schemas.microsoft.com/office/drawing/2014/main" id="{807BC917-228F-7279-16FF-693673951F3C}"/>
+              </a:ext>
+            </a:extLst>
+          </p:cNvPr>
+          <p:cNvSpPr/>
+          <p:nvPr/>
+        </p:nvSpPr>
+        <p:spPr>
+          <a:xfrm>
+            <a:off x="4784376" y="1409372"/>
+            <a:ext cx="2266075" cy="4534220"/>
+          </a:xfrm>
+          <a:prstGeom prst="rect">
+            <a:avLst/>
+          </a:prstGeom>
+          <a:noFill/>
+          <a:ln w="22225" cmpd="tri">
+            <a:solidFill>
+              <a:schemeClr val="tx1"/>
+            </a:solidFill>
+            <a:prstDash val="sysDash"/>
+          </a:ln>
+        </p:spPr>
+        <p:style>
+          <a:lnRef idx="2">
+            <a:schemeClr val="accent1">
+              <a:shade val="15000"/>
+            </a:schemeClr>
+          </a:lnRef>
+          <a:fillRef idx="1">
+            <a:schemeClr val="accent1"/>
+          </a:fillRef>
+          <a:effectRef idx="0">
+            <a:schemeClr val="accent1"/>
+          </a:effectRef>
+          <a:fontRef idx="minor">
+            <a:schemeClr val="lt1"/>
+          </a:fontRef>
+        </p:style>
+        <p:txBody>
+          <a:bodyPr rtlCol="0" anchor="ctr"/>
+          <a:lstStyle/>
+          <a:p>
+            <a:pPr algn="ctr"/>
+            <a:endParaRPr lang="es-ES"/>
+          </a:p>
+        </p:txBody>
+      </p:sp>
+      <p:cxnSp>
+        <p:nvCxnSpPr>
+          <p:cNvPr id="50" name="Conector recto de flecha 49">
+            <a:extLst>
+              <a:ext uri="{FF2B5EF4-FFF2-40B4-BE49-F238E27FC236}">
+                <a16:creationId xmlns:a16="http://schemas.microsoft.com/office/drawing/2014/main" id="{ABFA6148-3746-AE2F-4F44-91DFF0C43036}"/>
+              </a:ext>
+            </a:extLst>
+          </p:cNvPr>
+          <p:cNvCxnSpPr>
+            <a:cxnSpLocks/>
+          </p:cNvCxnSpPr>
+          <p:nvPr/>
+        </p:nvCxnSpPr>
+        <p:spPr>
+          <a:xfrm>
+            <a:off x="7303570" y="3438486"/>
+            <a:ext cx="621370" cy="0"/>
+          </a:xfrm>
+          <a:prstGeom prst="straightConnector1">
+            <a:avLst/>
+          </a:prstGeom>
+          <a:ln>
+            <a:tailEnd type="triangle"/>
+          </a:ln>
+        </p:spPr>
+        <p:style>
+          <a:lnRef idx="1">
+            <a:schemeClr val="accent1"/>
+          </a:lnRef>
+          <a:fillRef idx="0">
+            <a:schemeClr val="accent1"/>
+          </a:fillRef>
+          <a:effectRef idx="0">
+            <a:schemeClr val="accent1"/>
+          </a:effectRef>
+          <a:fontRef idx="minor">
+            <a:schemeClr val="tx1"/>
+          </a:fontRef>
+        </p:style>
+      </p:cxnSp>
+      <p:grpSp>
+        <p:nvGrpSpPr>
+          <p:cNvPr id="54" name="Grupo 53">
+            <a:extLst>
+              <a:ext uri="{FF2B5EF4-FFF2-40B4-BE49-F238E27FC236}">
+                <a16:creationId xmlns:a16="http://schemas.microsoft.com/office/drawing/2014/main" id="{CDF0A71F-1CDA-FC03-9E55-AD93DA3EFB47}"/>
+              </a:ext>
+            </a:extLst>
+          </p:cNvPr>
+          <p:cNvGrpSpPr/>
+          <p:nvPr/>
+        </p:nvGrpSpPr>
+        <p:grpSpPr>
+          <a:xfrm>
+            <a:off x="8596209" y="3925562"/>
+            <a:ext cx="1491536" cy="1351426"/>
+            <a:chOff x="8776318" y="3495929"/>
+            <a:chExt cx="1045317" cy="1024595"/>
+          </a:xfrm>
+        </p:grpSpPr>
+        <p:pic>
+          <p:nvPicPr>
+            <p:cNvPr id="52" name="Imagen 51" descr="Logotipo, nombre de la empresa&#10;&#10;Descripción generada automáticamente">
+              <a:extLst>
+                <a:ext uri="{FF2B5EF4-FFF2-40B4-BE49-F238E27FC236}">
+                  <a16:creationId xmlns:a16="http://schemas.microsoft.com/office/drawing/2014/main" id="{A1FC2C3C-FA5F-7BCD-0A0A-0B6DCFBB1FAF}"/>
+                </a:ext>
+              </a:extLst>
+            </p:cNvPr>
+            <p:cNvPicPr>
+              <a:picLocks noChangeAspect="1"/>
+            </p:cNvPicPr>
+            <p:nvPr/>
+          </p:nvPicPr>
+          <p:blipFill>
+            <a:blip r:embed="rId10"/>
+            <a:stretch>
+              <a:fillRect/>
+            </a:stretch>
+          </p:blipFill>
+          <p:spPr>
+            <a:xfrm>
+              <a:off x="8776318" y="3735933"/>
+              <a:ext cx="1045317" cy="784591"/>
+            </a:xfrm>
+            <a:prstGeom prst="rect">
+              <a:avLst/>
+            </a:prstGeom>
+          </p:spPr>
+        </p:pic>
+        <p:sp>
+          <p:nvSpPr>
+            <p:cNvPr id="53" name="CuadroTexto 52">
+              <a:extLst>
+                <a:ext uri="{FF2B5EF4-FFF2-40B4-BE49-F238E27FC236}">
+                  <a16:creationId xmlns:a16="http://schemas.microsoft.com/office/drawing/2014/main" id="{39AAD5BA-E5D2-6A11-5502-6EBF0C19B7D5}"/>
+                </a:ext>
+              </a:extLst>
+            </p:cNvPr>
+            <p:cNvSpPr txBox="1"/>
+            <p:nvPr/>
+          </p:nvSpPr>
+          <p:spPr>
+            <a:xfrm>
+              <a:off x="8915369" y="3495929"/>
+              <a:ext cx="748924" cy="276999"/>
+            </a:xfrm>
+            <a:prstGeom prst="rect">
+              <a:avLst/>
+            </a:prstGeom>
+            <a:noFill/>
+          </p:spPr>
+          <p:txBody>
+            <a:bodyPr wrap="none" rtlCol="0">
+              <a:spAutoFit/>
+            </a:bodyPr>
+            <a:lstStyle/>
+            <a:p>
+              <a:pPr algn="ctr"/>
+              <a:r>
+                <a:rPr lang="es-PE" sz="1200" b="1" dirty="0"/>
+                <a:t>MySQL</a:t>
+              </a:r>
+            </a:p>
+          </p:txBody>
+        </p:sp>
+      </p:grpSp>
+      <p:sp>
+        <p:nvSpPr>
+          <p:cNvPr id="55" name="Rectángulo 54">
+            <a:extLst>
+              <a:ext uri="{FF2B5EF4-FFF2-40B4-BE49-F238E27FC236}">
+                <a16:creationId xmlns:a16="http://schemas.microsoft.com/office/drawing/2014/main" id="{A617F35F-9553-BB89-8115-4F2CDA48E825}"/>
+              </a:ext>
+            </a:extLst>
+          </p:cNvPr>
+          <p:cNvSpPr/>
+          <p:nvPr/>
+        </p:nvSpPr>
+        <p:spPr>
+          <a:xfrm>
+            <a:off x="8208940" y="1409372"/>
+            <a:ext cx="2266075" cy="4534220"/>
+          </a:xfrm>
+          <a:prstGeom prst="rect">
+            <a:avLst/>
+          </a:prstGeom>
+          <a:noFill/>
+          <a:ln w="22225" cmpd="tri">
+            <a:solidFill>
+              <a:schemeClr val="tx1"/>
+            </a:solidFill>
+            <a:prstDash val="sysDash"/>
+          </a:ln>
+        </p:spPr>
+        <p:style>
+          <a:lnRef idx="2">
+            <a:schemeClr val="accent1">
+              <a:shade val="15000"/>
+            </a:schemeClr>
+          </a:lnRef>
+          <a:fillRef idx="1">
+            <a:schemeClr val="accent1"/>
+          </a:fillRef>
+          <a:effectRef idx="0">
+            <a:schemeClr val="accent1"/>
+          </a:effectRef>
+          <a:fontRef idx="minor">
+            <a:schemeClr val="lt1"/>
+          </a:fontRef>
+        </p:style>
+        <p:txBody>
+          <a:bodyPr rtlCol="0" anchor="ctr"/>
+          <a:lstStyle/>
+          <a:p>
+            <a:pPr algn="ctr"/>
+            <a:endParaRPr lang="es-ES"/>
+          </a:p>
+        </p:txBody>
+      </p:sp>
+      <p:sp>
+        <p:nvSpPr>
+          <p:cNvPr id="56" name="CuadroTexto 55">
+            <a:extLst>
+              <a:ext uri="{FF2B5EF4-FFF2-40B4-BE49-F238E27FC236}">
+                <a16:creationId xmlns:a16="http://schemas.microsoft.com/office/drawing/2014/main" id="{027438BA-5708-A5CC-7904-6E3686EDA37C}"/>
+              </a:ext>
+            </a:extLst>
+          </p:cNvPr>
+          <p:cNvSpPr txBox="1"/>
+          <p:nvPr/>
+        </p:nvSpPr>
+        <p:spPr>
+          <a:xfrm>
+            <a:off x="5357386" y="1031672"/>
+            <a:ext cx="1059906" cy="246221"/>
+          </a:xfrm>
+          <a:prstGeom prst="rect">
+            <a:avLst/>
+          </a:prstGeom>
+          <a:noFill/>
+        </p:spPr>
+        <p:txBody>
+          <a:bodyPr wrap="none" rtlCol="0">
+            <a:spAutoFit/>
+          </a:bodyPr>
+          <a:lstStyle/>
+          <a:p>
+            <a:r>
+              <a:rPr lang="es-PE" sz="1000" dirty="0"/>
+              <a:t>Procesamiento</a:t>
+            </a:r>
+            <a:endParaRPr lang="es-ES" sz="1000" dirty="0"/>
+          </a:p>
+        </p:txBody>
+      </p:sp>
+      <p:sp>
+        <p:nvSpPr>
+          <p:cNvPr id="57" name="CuadroTexto 56">
+            <a:extLst>
+              <a:ext uri="{FF2B5EF4-FFF2-40B4-BE49-F238E27FC236}">
+                <a16:creationId xmlns:a16="http://schemas.microsoft.com/office/drawing/2014/main" id="{2745EAC1-3B5D-E93F-65AC-BD7DE564BDBA}"/>
+              </a:ext>
+            </a:extLst>
+          </p:cNvPr>
+          <p:cNvSpPr txBox="1"/>
+          <p:nvPr/>
+        </p:nvSpPr>
+        <p:spPr>
+          <a:xfrm>
+            <a:off x="8778217" y="1024333"/>
+            <a:ext cx="1178528" cy="246221"/>
+          </a:xfrm>
+          <a:prstGeom prst="rect">
+            <a:avLst/>
+          </a:prstGeom>
+          <a:noFill/>
+        </p:spPr>
+        <p:txBody>
+          <a:bodyPr wrap="none" rtlCol="0">
+            <a:spAutoFit/>
+          </a:bodyPr>
+          <a:lstStyle/>
+          <a:p>
+            <a:r>
+              <a:rPr lang="es-PE" sz="1000" dirty="0"/>
+              <a:t>Almacenamiento</a:t>
+            </a:r>
+            <a:endParaRPr lang="es-ES" sz="1000" dirty="0"/>
+          </a:p>
+        </p:txBody>
+      </p:sp>
+    </p:spTree>
+    <p:extLst>
+      <p:ext uri="{BB962C8B-B14F-4D97-AF65-F5344CB8AC3E}">
+        <p14:creationId xmlns:p14="http://schemas.microsoft.com/office/powerpoint/2010/main" val="76182120"/>
+      </p:ext>
+    </p:extLst>
+  </p:cSld>
+  <p:clrMapOvr>
+    <a:masterClrMapping/>
+  </p:clrMapOvr>
+</p:sld>
+</file>
+
+<file path=ppt/slides/slide14.xml><?xml version="1.0" encoding="utf-8"?>
+<p:sld xmlns:a="http://schemas.openxmlformats.org/drawingml/2006/main" xmlns:r="http://schemas.openxmlformats.org/officeDocument/2006/relationships" xmlns:p="http://schemas.openxmlformats.org/presentationml/2006/main">
+  <p:cSld>
+    <p:spTree>
+      <p:nvGrpSpPr>
+        <p:cNvPr id="1" name="">
+          <a:extLst>
+            <a:ext uri="{FF2B5EF4-FFF2-40B4-BE49-F238E27FC236}">
+              <a16:creationId xmlns:a16="http://schemas.microsoft.com/office/drawing/2014/main" id="{595A39E4-5A0D-DB3C-8530-670D3E1322EA}"/>
+            </a:ext>
+          </a:extLst>
+        </p:cNvPr>
+        <p:cNvGrpSpPr/>
+        <p:nvPr/>
+      </p:nvGrpSpPr>
+      <p:grpSpPr>
+        <a:xfrm>
+          <a:off x="0" y="0"/>
+          <a:ext cx="0" cy="0"/>
+          <a:chOff x="0" y="0"/>
+          <a:chExt cx="0" cy="0"/>
+        </a:xfrm>
+      </p:grpSpPr>
+      <p:sp>
+        <p:nvSpPr>
+          <p:cNvPr id="2" name="CuadroTexto 1">
+            <a:extLst>
+              <a:ext uri="{FF2B5EF4-FFF2-40B4-BE49-F238E27FC236}">
+                <a16:creationId xmlns:a16="http://schemas.microsoft.com/office/drawing/2014/main" id="{41C3AF58-DF93-36E8-A482-4EAC2F97AF9C}"/>
+              </a:ext>
+            </a:extLst>
+          </p:cNvPr>
+          <p:cNvSpPr txBox="1"/>
+          <p:nvPr/>
+        </p:nvSpPr>
+        <p:spPr>
+          <a:xfrm>
+            <a:off x="93305" y="550507"/>
+            <a:ext cx="1985287" cy="400110"/>
+          </a:xfrm>
+          <a:prstGeom prst="rect">
+            <a:avLst/>
+          </a:prstGeom>
+          <a:noFill/>
+        </p:spPr>
+        <p:txBody>
+          <a:bodyPr wrap="none" rtlCol="0">
+            <a:spAutoFit/>
+          </a:bodyPr>
+          <a:lstStyle/>
+          <a:p>
+            <a:r>
+              <a:rPr lang="es-PE" sz="2000" b="1" dirty="0">
+                <a:latin typeface="Times New Roman" panose="02020603050405020304" pitchFamily="18" charset="0"/>
+                <a:cs typeface="Times New Roman" panose="02020603050405020304" pitchFamily="18" charset="0"/>
+              </a:rPr>
+              <a:t>SISTEMA WEB</a:t>
+            </a:r>
+          </a:p>
+        </p:txBody>
+      </p:sp>
+      <p:sp>
+        <p:nvSpPr>
+          <p:cNvPr id="10" name="CuadroTexto 9">
+            <a:extLst>
+              <a:ext uri="{FF2B5EF4-FFF2-40B4-BE49-F238E27FC236}">
+                <a16:creationId xmlns:a16="http://schemas.microsoft.com/office/drawing/2014/main" id="{F1769E8A-6E4F-B139-EACB-6252F2B656EF}"/>
+              </a:ext>
+            </a:extLst>
+          </p:cNvPr>
+          <p:cNvSpPr txBox="1"/>
+          <p:nvPr/>
+        </p:nvSpPr>
+        <p:spPr>
+          <a:xfrm>
             <a:off x="4304922" y="6271969"/>
             <a:ext cx="2710999" cy="369332"/>
           </a:xfrm>
@@ -8828,7 +10052,7 @@
           <p:cNvPr id="5" name="Imagen 4">
             <a:extLst>
               <a:ext uri="{FF2B5EF4-FFF2-40B4-BE49-F238E27FC236}">
-                <a16:creationId xmlns:a16="http://schemas.microsoft.com/office/drawing/2014/main" id="{5E5065FF-16F5-E429-23A2-9013B8830F16}"/>
+                <a16:creationId xmlns:a16="http://schemas.microsoft.com/office/drawing/2014/main" id="{5B14F84B-0C53-3F1C-6896-23C38D8D7416}"/>
               </a:ext>
             </a:extLst>
           </p:cNvPr>
@@ -8857,7 +10081,7 @@
           <p:cNvPr id="7" name="Imagen 6">
             <a:extLst>
               <a:ext uri="{FF2B5EF4-FFF2-40B4-BE49-F238E27FC236}">
-                <a16:creationId xmlns:a16="http://schemas.microsoft.com/office/drawing/2014/main" id="{B7BAE764-B344-2EC3-E951-AD62B4C31F98}"/>
+                <a16:creationId xmlns:a16="http://schemas.microsoft.com/office/drawing/2014/main" id="{D08D9043-0762-B786-59FC-99F3D0FDA83B}"/>
               </a:ext>
             </a:extLst>
           </p:cNvPr>
@@ -8887,7 +10111,7 @@
           <p:cNvPr id="9" name="Imagen 8">
             <a:extLst>
               <a:ext uri="{FF2B5EF4-FFF2-40B4-BE49-F238E27FC236}">
-                <a16:creationId xmlns:a16="http://schemas.microsoft.com/office/drawing/2014/main" id="{B8DA44FB-C3B2-8F50-CDD1-1B0D396EDA65}"/>
+                <a16:creationId xmlns:a16="http://schemas.microsoft.com/office/drawing/2014/main" id="{3E1879E8-34D6-21A4-CA01-4AA1D95892D6}"/>
               </a:ext>
             </a:extLst>
           </p:cNvPr>
@@ -8915,7 +10139,7 @@
     </p:spTree>
     <p:extLst>
       <p:ext uri="{BB962C8B-B14F-4D97-AF65-F5344CB8AC3E}">
-        <p14:creationId xmlns:p14="http://schemas.microsoft.com/office/powerpoint/2010/main" val="76182120"/>
+        <p14:creationId xmlns:p14="http://schemas.microsoft.com/office/powerpoint/2010/main" val="1353761206"/>
       </p:ext>
     </p:extLst>
   </p:cSld>
@@ -8925,7 +10149,7 @@
 </p:sld>
 </file>
 
-<file path=ppt/slides/slide14.xml><?xml version="1.0" encoding="utf-8"?>
+<file path=ppt/slides/slide15.xml><?xml version="1.0" encoding="utf-8"?>
 <p:sld xmlns:a="http://schemas.openxmlformats.org/drawingml/2006/main" xmlns:r="http://schemas.openxmlformats.org/officeDocument/2006/relationships" xmlns:p="http://schemas.openxmlformats.org/presentationml/2006/main">
   <p:cSld>
     <p:spTree>
@@ -9019,7 +10243,7 @@
 </p:sld>
 </file>
 
-<file path=ppt/slides/slide15.xml><?xml version="1.0" encoding="utf-8"?>
+<file path=ppt/slides/slide16.xml><?xml version="1.0" encoding="utf-8"?>
 <p:sld xmlns:a="http://schemas.openxmlformats.org/drawingml/2006/main" xmlns:r="http://schemas.openxmlformats.org/officeDocument/2006/relationships" xmlns:p="http://schemas.openxmlformats.org/presentationml/2006/main">
   <p:cSld>
     <p:spTree>
@@ -9113,7 +10337,7 @@
 </p:sld>
 </file>
 
-<file path=ppt/slides/slide16.xml><?xml version="1.0" encoding="utf-8"?>
+<file path=ppt/slides/slide17.xml><?xml version="1.0" encoding="utf-8"?>
 <p:sld xmlns:a="http://schemas.openxmlformats.org/drawingml/2006/main" xmlns:r="http://schemas.openxmlformats.org/officeDocument/2006/relationships" xmlns:p="http://schemas.openxmlformats.org/presentationml/2006/main">
   <p:cSld>
     <p:spTree>
@@ -9568,7 +10792,7 @@
 </p:sld>
 </file>
 
-<file path=ppt/slides/slide17.xml><?xml version="1.0" encoding="utf-8"?>
+<file path=ppt/slides/slide18.xml><?xml version="1.0" encoding="utf-8"?>
 <p:sld xmlns:a="http://schemas.openxmlformats.org/drawingml/2006/main" xmlns:r="http://schemas.openxmlformats.org/officeDocument/2006/relationships" xmlns:p="http://schemas.openxmlformats.org/presentationml/2006/main">
   <p:cSld>
     <p:spTree>
@@ -9662,7 +10886,7 @@
 </p:sld>
 </file>
 
-<file path=ppt/slides/slide18.xml><?xml version="1.0" encoding="utf-8"?>
+<file path=ppt/slides/slide19.xml><?xml version="1.0" encoding="utf-8"?>
 <p:sld xmlns:a="http://schemas.openxmlformats.org/drawingml/2006/main" xmlns:r="http://schemas.openxmlformats.org/officeDocument/2006/relationships" xmlns:p="http://schemas.openxmlformats.org/presentationml/2006/main">
   <p:cSld>
     <p:spTree>

</xml_diff>